<commit_message>
style (wrong underline) fix
</commit_message>
<xml_diff>
--- a/Presentations/ECNS 2015/mantid_imaging_ecns2015_poster_20150826_printed.pptx
+++ b/Presentations/ECNS 2015/mantid_imaging_ecns2015_poster_20150826_printed.pptx
@@ -226,7 +226,7 @@
             <a:fld id="{E78E1D5F-7523-4815-A670-60864F601D30}" type="datetimeFigureOut">
               <a:rPr lang="en-GB" smtClean="0"/>
               <a:pPr/>
-              <a:t>26/08/2015</a:t>
+              <a:t>21/09/2015</a:t>
             </a:fld>
             <a:endParaRPr lang="en-GB"/>
           </a:p>
@@ -393,7 +393,7 @@
             <a:fld id="{376B4F07-E738-4DFD-883D-BE3839CD703B}" type="datetimeFigureOut">
               <a:rPr lang="en-GB" smtClean="0"/>
               <a:pPr/>
-              <a:t>26/08/2015</a:t>
+              <a:t>21/09/2015</a:t>
             </a:fld>
             <a:endParaRPr lang="en-GB"/>
           </a:p>
@@ -3153,7 +3153,7 @@
           <p:nvPr>
             <p:extLst>
               <p:ext uri="{D42A27DB-BD31-4B8C-83A1-F6EECF244321}">
-                <p14:modId xmlns:p14="http://schemas.microsoft.com/office/powerpoint/2010/main" val="1537925183"/>
+                <p14:modId xmlns:p14="http://schemas.microsoft.com/office/powerpoint/2010/main" val="716533342"/>
               </p:ext>
             </p:extLst>
           </p:nvPr>
@@ -6547,8 +6547,33 @@
                           <a:latin typeface="+mj-lt"/>
                           <a:cs typeface="Arial" pitchFamily="34" charset="0"/>
                         </a:rPr>
-                        <a:t>Tomography: reconstruction tools</a:t>
-                      </a:r>
+                        <a:t>Tomography: reconstruction </a:t>
+                      </a:r>
+                      <a:r>
+                        <a:rPr kumimoji="0" lang="en-US" sz="5000" b="0" i="0" u="none" strike="noStrike" kern="0" cap="none" normalizeH="0" baseline="0" dirty="0" smtClean="0">
+                          <a:ln>
+                            <a:noFill/>
+                          </a:ln>
+                          <a:solidFill>
+                            <a:srgbClr val="002D55"/>
+                          </a:solidFill>
+                          <a:effectLst/>
+                          <a:latin typeface="+mj-lt"/>
+                          <a:cs typeface="Arial" pitchFamily="34" charset="0"/>
+                        </a:rPr>
+                        <a:t>tools</a:t>
+                      </a:r>
+                      <a:endParaRPr kumimoji="0" lang="en-US" sz="5000" b="0" i="0" u="none" strike="noStrike" kern="0" cap="none" normalizeH="0" baseline="0" dirty="0" smtClean="0">
+                        <a:ln>
+                          <a:noFill/>
+                        </a:ln>
+                        <a:solidFill>
+                          <a:srgbClr val="002D55"/>
+                        </a:solidFill>
+                        <a:effectLst/>
+                        <a:latin typeface="+mj-lt"/>
+                        <a:cs typeface="Arial" pitchFamily="34" charset="0"/>
+                      </a:endParaRPr>
                     </a:p>
                     <a:p>
                       <a:pPr marL="0" marR="0" lvl="0" indent="0" algn="just" defTabSz="4173538" rtl="0" eaLnBrk="1" fontAlgn="base" latinLnBrk="0" hangingPunct="1">
@@ -6753,31 +6778,7 @@
                           <a:ea typeface="+mn-ea"/>
                           <a:cs typeface="Arial" panose="020B0604020202020204" pitchFamily="34" charset="0"/>
                         </a:rPr>
-                        <a:t> </a:t>
-                      </a:r>
-                      <a:r>
-                        <a:rPr lang="en-US" sz="2400" kern="1200" dirty="0" smtClean="0">
-                          <a:solidFill>
-                            <a:schemeClr val="tx1"/>
-                          </a:solidFill>
-                          <a:effectLst/>
-                          <a:latin typeface="Arial" panose="020B0604020202020204" pitchFamily="34" charset="0"/>
-                          <a:ea typeface="+mn-ea"/>
-                          <a:cs typeface="Arial" panose="020B0604020202020204" pitchFamily="34" charset="0"/>
-                        </a:rPr>
-                        <a:t>developed </a:t>
-                      </a:r>
-                      <a:r>
-                        <a:rPr lang="en-US" sz="2400" kern="1200" dirty="0" smtClean="0">
-                          <a:solidFill>
-                            <a:schemeClr val="tx1"/>
-                          </a:solidFill>
-                          <a:effectLst/>
-                          <a:latin typeface="Arial" panose="020B0604020202020204" pitchFamily="34" charset="0"/>
-                          <a:ea typeface="+mn-ea"/>
-                          <a:cs typeface="Arial" panose="020B0604020202020204" pitchFamily="34" charset="0"/>
-                        </a:rPr>
-                        <a:t>by the Diamond light source. Different reconstruction approaches are thus supported, namely filtered back projection and iterative methods such as simultaneous iterative reconstruction technique, but also variants of these developed in different tools. </a:t>
+                        <a:t> developed by the Diamond light source. Different reconstruction approaches are thus supported, namely filtered back projection and iterative methods such as simultaneous iterative reconstruction technique, but also variants of these developed in different tools. </a:t>
                       </a:r>
                       <a:r>
                         <a:rPr lang="en-US" sz="2400" kern="1200" dirty="0" err="1" smtClean="0">
@@ -8628,22 +8629,10 @@
                           <a:ea typeface="+mn-ea"/>
                           <a:cs typeface="Arial"/>
                         </a:rPr>
-                        <a:t>[2</a:t>
-                      </a:r>
-                      <a:r>
-                        <a:rPr lang="en-GB" sz="1800" kern="1200" smtClean="0">
-                          <a:solidFill>
-                            <a:schemeClr val="tx1"/>
-                          </a:solidFill>
-                          <a:effectLst/>
-                          <a:latin typeface="Corisande Light (Body)"/>
-                          <a:ea typeface="+mn-ea"/>
-                          <a:cs typeface="Arial"/>
-                        </a:rPr>
-                        <a:t>] </a:t>
-                      </a:r>
-                      <a:r>
-                        <a:rPr lang="en-GB" sz="1800" u="sng" kern="1200" smtClean="0">
+                        <a:t>[2] </a:t>
+                      </a:r>
+                      <a:r>
+                        <a:rPr lang="en-GB" sz="1800" u="sng" kern="1200" dirty="0" smtClean="0">
                           <a:solidFill>
                             <a:schemeClr val="tx1"/>
                           </a:solidFill>
@@ -8800,10 +8789,10 @@
                           <a:ea typeface="+mn-ea"/>
                           <a:cs typeface="+mn-cs"/>
                         </a:rPr>
-                        <a:t> D, De Carlo F, Xiao X, and Jacobsen C, (2014</a:t>
-                      </a:r>
-                      <a:r>
-                        <a:rPr lang="en-GB" sz="1800" kern="1200" dirty="0" smtClean="0">
+                        <a:t> D, De Carlo F, Xiao X, and Jacobsen C, (2014). </a:t>
+                      </a:r>
+                      <a:r>
+                        <a:rPr lang="en-GB" sz="1800" kern="1200" dirty="0" err="1" smtClean="0">
                           <a:solidFill>
                             <a:schemeClr val="tx1"/>
                           </a:solidFill>
@@ -8812,10 +8801,10 @@
                           <a:ea typeface="+mn-ea"/>
                           <a:cs typeface="+mn-cs"/>
                         </a:rPr>
-                        <a:t>). </a:t>
-                      </a:r>
-                      <a:r>
-                        <a:rPr lang="en-GB" sz="1800" kern="1200" dirty="0" err="1" smtClean="0">
+                        <a:t>TomoPy</a:t>
+                      </a:r>
+                      <a:r>
+                        <a:rPr lang="en-GB" sz="1800" kern="1200" dirty="0" smtClean="0">
                           <a:solidFill>
                             <a:schemeClr val="tx1"/>
                           </a:solidFill>
@@ -8824,18 +8813,6 @@
                           <a:ea typeface="+mn-ea"/>
                           <a:cs typeface="+mn-cs"/>
                         </a:rPr>
-                        <a:t>TomoPy</a:t>
-                      </a:r>
-                      <a:r>
-                        <a:rPr lang="en-GB" sz="1800" kern="1200" dirty="0" smtClean="0">
-                          <a:solidFill>
-                            <a:schemeClr val="tx1"/>
-                          </a:solidFill>
-                          <a:effectLst/>
-                          <a:latin typeface="Corisande Light (Body)"/>
-                          <a:ea typeface="+mn-ea"/>
-                          <a:cs typeface="+mn-cs"/>
-                        </a:rPr>
                         <a:t>: a framework for the analysis of synchrotron tomographic data. Journal of Synchrotron Radiation, 21(5):1188–1193. </a:t>
                       </a:r>
                       <a:endParaRPr lang="en-GB" sz="1800" u="sng" kern="1200" dirty="0" smtClean="0">
@@ -8859,19 +8836,7 @@
                           <a:ea typeface="+mn-ea"/>
                           <a:cs typeface="Arial"/>
                         </a:rPr>
-                        <a:t>[</a:t>
-                      </a:r>
-                      <a:r>
-                        <a:rPr lang="en-GB" sz="1800" u="none" kern="1200" dirty="0" smtClean="0">
-                          <a:solidFill>
-                            <a:schemeClr val="tx1"/>
-                          </a:solidFill>
-                          <a:effectLst/>
-                          <a:latin typeface="Corisande Light (Body)"/>
-                          <a:ea typeface="+mn-ea"/>
-                          <a:cs typeface="Arial"/>
-                        </a:rPr>
-                        <a:t>5] </a:t>
+                        <a:t>[5] </a:t>
                       </a:r>
                       <a:r>
                         <a:rPr lang="en-GB" sz="1800" dirty="0" smtClean="0">
@@ -9004,7 +8969,7 @@
                         <a:defRPr/>
                       </a:pPr>
                       <a:r>
-                        <a:rPr lang="en-GB" sz="1800" u="sng" kern="1200" dirty="0" smtClean="0">
+                        <a:rPr lang="en-GB" sz="1800" u="none" kern="1200" dirty="0" smtClean="0">
                           <a:solidFill>
                             <a:schemeClr val="tx1"/>
                           </a:solidFill>
@@ -12690,19 +12655,6 @@
 </file>
 
 <file path=customXml/item1.xml><?xml version="1.0" encoding="utf-8"?>
-<LongProperties xmlns="http://schemas.microsoft.com/office/2006/metadata/longProperties"/>
-</file>
-
-<file path=customXml/item2.xml><?xml version="1.0" encoding="utf-8"?>
-<?mso-contentType ?>
-<FormTemplates xmlns="http://schemas.microsoft.com/sharepoint/v3/contenttype/forms">
-  <Display>DocumentLibraryForm</Display>
-  <Edit>DocumentLibraryForm</Edit>
-  <New>DocumentLibraryForm</New>
-</FormTemplates>
-</file>
-
-<file path=customXml/item3.xml><?xml version="1.0" encoding="utf-8"?>
 <ct:contentTypeSchema xmlns:ct="http://schemas.microsoft.com/office/2006/metadata/contentType" xmlns:ma="http://schemas.microsoft.com/office/2006/metadata/properties/metaAttributes" ct:_="" ma:_="" ma:contentTypeName="Document" ma:contentTypeID="0x0101000BFEB35FB51C0F42A9A471BD9DD2DD1B" ma:contentTypeVersion="1" ma:contentTypeDescription="Create a new document." ma:contentTypeScope="" ma:versionID="35a5236f1a4e3acf6a385f2c1bfe2746">
   <xsd:schema xmlns:xsd="http://www.w3.org/2001/XMLSchema" xmlns:xs="http://www.w3.org/2001/XMLSchema" xmlns:p="http://schemas.microsoft.com/office/2006/metadata/properties" xmlns:ns1="http://schemas.microsoft.com/sharepoint/v3" targetNamespace="http://schemas.microsoft.com/office/2006/metadata/properties" ma:root="true" ma:fieldsID="a447206dab0015f8b9f8924535193e8c" ns1:_="">
     <xsd:import namespace="http://schemas.microsoft.com/sharepoint/v3"/>
@@ -12834,6 +12786,19 @@
 </ct:contentTypeSchema>
 </file>
 
+<file path=customXml/item2.xml><?xml version="1.0" encoding="utf-8"?>
+<?mso-contentType ?>
+<FormTemplates xmlns="http://schemas.microsoft.com/sharepoint/v3/contenttype/forms">
+  <Display>DocumentLibraryForm</Display>
+  <Edit>DocumentLibraryForm</Edit>
+  <New>DocumentLibraryForm</New>
+</FormTemplates>
+</file>
+
+<file path=customXml/item3.xml><?xml version="1.0" encoding="utf-8"?>
+<LongProperties xmlns="http://schemas.microsoft.com/office/2006/metadata/longProperties"/>
+</file>
+
 <file path=customXml/item4.xml><?xml version="1.0" encoding="utf-8"?>
 <p:properties xmlns:p="http://schemas.microsoft.com/office/2006/metadata/properties" xmlns:xsi="http://www.w3.org/2001/XMLSchema-instance">
   <documentManagement>
@@ -12844,22 +12809,6 @@
 </file>
 
 <file path=customXml/itemProps1.xml><?xml version="1.0" encoding="utf-8"?>
-<ds:datastoreItem xmlns:ds="http://schemas.openxmlformats.org/officeDocument/2006/customXml" ds:itemID="{5593874F-BA98-4A0D-88E6-76DECBDFE515}">
-  <ds:schemaRefs>
-    <ds:schemaRef ds:uri="http://schemas.microsoft.com/office/2006/metadata/longProperties"/>
-  </ds:schemaRefs>
-</ds:datastoreItem>
-</file>
-
-<file path=customXml/itemProps2.xml><?xml version="1.0" encoding="utf-8"?>
-<ds:datastoreItem xmlns:ds="http://schemas.openxmlformats.org/officeDocument/2006/customXml" ds:itemID="{BB870582-39B3-4EE1-B4C9-D3C3087CF0F0}">
-  <ds:schemaRefs>
-    <ds:schemaRef ds:uri="http://schemas.microsoft.com/sharepoint/v3/contenttype/forms"/>
-  </ds:schemaRefs>
-</ds:datastoreItem>
-</file>
-
-<file path=customXml/itemProps3.xml><?xml version="1.0" encoding="utf-8"?>
 <ds:datastoreItem xmlns:ds="http://schemas.openxmlformats.org/officeDocument/2006/customXml" ds:itemID="{3B5FA4EA-6C34-4AED-AF36-BD45CB995C14}">
   <ds:schemaRefs>
     <ds:schemaRef ds:uri="http://schemas.microsoft.com/office/2006/metadata/contentType"/>
@@ -12877,18 +12826,34 @@
 </ds:datastoreItem>
 </file>
 
+<file path=customXml/itemProps2.xml><?xml version="1.0" encoding="utf-8"?>
+<ds:datastoreItem xmlns:ds="http://schemas.openxmlformats.org/officeDocument/2006/customXml" ds:itemID="{BB870582-39B3-4EE1-B4C9-D3C3087CF0F0}">
+  <ds:schemaRefs>
+    <ds:schemaRef ds:uri="http://schemas.microsoft.com/sharepoint/v3/contenttype/forms"/>
+  </ds:schemaRefs>
+</ds:datastoreItem>
+</file>
+
+<file path=customXml/itemProps3.xml><?xml version="1.0" encoding="utf-8"?>
+<ds:datastoreItem xmlns:ds="http://schemas.openxmlformats.org/officeDocument/2006/customXml" ds:itemID="{5593874F-BA98-4A0D-88E6-76DECBDFE515}">
+  <ds:schemaRefs>
+    <ds:schemaRef ds:uri="http://schemas.microsoft.com/office/2006/metadata/longProperties"/>
+  </ds:schemaRefs>
+</ds:datastoreItem>
+</file>
+
 <file path=customXml/itemProps4.xml><?xml version="1.0" encoding="utf-8"?>
 <ds:datastoreItem xmlns:ds="http://schemas.openxmlformats.org/officeDocument/2006/customXml" ds:itemID="{BBE466B2-E11B-4338-AFEC-553026806900}">
   <ds:schemaRefs>
+    <ds:schemaRef ds:uri="http://schemas.microsoft.com/office/2006/metadata/properties"/>
+    <ds:schemaRef ds:uri="http://purl.org/dc/terms/"/>
     <ds:schemaRef ds:uri="http://www.w3.org/XML/1998/namespace"/>
+    <ds:schemaRef ds:uri="http://purl.org/dc/dcmitype/"/>
+    <ds:schemaRef ds:uri="http://schemas.microsoft.com/sharepoint/v3"/>
+    <ds:schemaRef ds:uri="http://schemas.microsoft.com/office/2006/documentManagement/types"/>
+    <ds:schemaRef ds:uri="http://schemas.microsoft.com/office/infopath/2007/PartnerControls"/>
     <ds:schemaRef ds:uri="http://schemas.openxmlformats.org/package/2006/metadata/core-properties"/>
-    <ds:schemaRef ds:uri="http://purl.org/dc/dcmitype/"/>
-    <ds:schemaRef ds:uri="http://schemas.microsoft.com/office/2006/documentManagement/types"/>
-    <ds:schemaRef ds:uri="http://purl.org/dc/terms/"/>
-    <ds:schemaRef ds:uri="http://schemas.microsoft.com/office/2006/metadata/properties"/>
     <ds:schemaRef ds:uri="http://purl.org/dc/elements/1.1/"/>
-    <ds:schemaRef ds:uri="http://schemas.microsoft.com/office/infopath/2007/PartnerControls"/>
-    <ds:schemaRef ds:uri="http://schemas.microsoft.com/sharepoint/v3"/>
   </ds:schemaRefs>
 </ds:datastoreItem>
 </file>
</xml_diff>